<commit_message>
made some big graph ui changes
</commit_message>
<xml_diff>
--- a/flight.pptx
+++ b/flight.pptx
@@ -105,6 +105,11 @@
       </a:defRPr>
     </a:lvl9pPr>
   </p:defaultTextStyle>
+  <p:extLst>
+    <p:ext uri="{EFAFB233-063F-42B5-8137-9DF3F51BA10A}">
+      <p15:sldGuideLst xmlns:p15="http://schemas.microsoft.com/office/powerpoint/2012/main"/>
+    </p:ext>
+  </p:extLst>
 </p:presentation>
 </file>
 
@@ -255,7 +260,7 @@
           <a:p>
             <a:fld id="{3F6415CE-626B-CC40-8C77-CE2EB70E7300}" type="datetimeFigureOut">
               <a:rPr lang="en-US" smtClean="0"/>
-              <a:t>6/23/19</a:t>
+              <a:t>6/28/19</a:t>
             </a:fld>
             <a:endParaRPr lang="en-US"/>
           </a:p>
@@ -453,7 +458,7 @@
           <a:p>
             <a:fld id="{3F6415CE-626B-CC40-8C77-CE2EB70E7300}" type="datetimeFigureOut">
               <a:rPr lang="en-US" smtClean="0"/>
-              <a:t>6/23/19</a:t>
+              <a:t>6/28/19</a:t>
             </a:fld>
             <a:endParaRPr lang="en-US"/>
           </a:p>
@@ -661,7 +666,7 @@
           <a:p>
             <a:fld id="{3F6415CE-626B-CC40-8C77-CE2EB70E7300}" type="datetimeFigureOut">
               <a:rPr lang="en-US" smtClean="0"/>
-              <a:t>6/23/19</a:t>
+              <a:t>6/28/19</a:t>
             </a:fld>
             <a:endParaRPr lang="en-US"/>
           </a:p>
@@ -859,7 +864,7 @@
           <a:p>
             <a:fld id="{3F6415CE-626B-CC40-8C77-CE2EB70E7300}" type="datetimeFigureOut">
               <a:rPr lang="en-US" smtClean="0"/>
-              <a:t>6/23/19</a:t>
+              <a:t>6/28/19</a:t>
             </a:fld>
             <a:endParaRPr lang="en-US"/>
           </a:p>
@@ -1134,7 +1139,7 @@
           <a:p>
             <a:fld id="{3F6415CE-626B-CC40-8C77-CE2EB70E7300}" type="datetimeFigureOut">
               <a:rPr lang="en-US" smtClean="0"/>
-              <a:t>6/23/19</a:t>
+              <a:t>6/28/19</a:t>
             </a:fld>
             <a:endParaRPr lang="en-US"/>
           </a:p>
@@ -1399,7 +1404,7 @@
           <a:p>
             <a:fld id="{3F6415CE-626B-CC40-8C77-CE2EB70E7300}" type="datetimeFigureOut">
               <a:rPr lang="en-US" smtClean="0"/>
-              <a:t>6/23/19</a:t>
+              <a:t>6/28/19</a:t>
             </a:fld>
             <a:endParaRPr lang="en-US"/>
           </a:p>
@@ -1811,7 +1816,7 @@
           <a:p>
             <a:fld id="{3F6415CE-626B-CC40-8C77-CE2EB70E7300}" type="datetimeFigureOut">
               <a:rPr lang="en-US" smtClean="0"/>
-              <a:t>6/23/19</a:t>
+              <a:t>6/28/19</a:t>
             </a:fld>
             <a:endParaRPr lang="en-US"/>
           </a:p>
@@ -1952,7 +1957,7 @@
           <a:p>
             <a:fld id="{3F6415CE-626B-CC40-8C77-CE2EB70E7300}" type="datetimeFigureOut">
               <a:rPr lang="en-US" smtClean="0"/>
-              <a:t>6/23/19</a:t>
+              <a:t>6/28/19</a:t>
             </a:fld>
             <a:endParaRPr lang="en-US"/>
           </a:p>
@@ -2065,7 +2070,7 @@
           <a:p>
             <a:fld id="{3F6415CE-626B-CC40-8C77-CE2EB70E7300}" type="datetimeFigureOut">
               <a:rPr lang="en-US" smtClean="0"/>
-              <a:t>6/23/19</a:t>
+              <a:t>6/28/19</a:t>
             </a:fld>
             <a:endParaRPr lang="en-US"/>
           </a:p>
@@ -2376,7 +2381,7 @@
           <a:p>
             <a:fld id="{3F6415CE-626B-CC40-8C77-CE2EB70E7300}" type="datetimeFigureOut">
               <a:rPr lang="en-US" smtClean="0"/>
-              <a:t>6/23/19</a:t>
+              <a:t>6/28/19</a:t>
             </a:fld>
             <a:endParaRPr lang="en-US"/>
           </a:p>
@@ -2664,7 +2669,7 @@
           <a:p>
             <a:fld id="{3F6415CE-626B-CC40-8C77-CE2EB70E7300}" type="datetimeFigureOut">
               <a:rPr lang="en-US" smtClean="0"/>
-              <a:t>6/23/19</a:t>
+              <a:t>6/28/19</a:t>
             </a:fld>
             <a:endParaRPr lang="en-US"/>
           </a:p>
@@ -2905,7 +2910,7 @@
           <a:p>
             <a:fld id="{3F6415CE-626B-CC40-8C77-CE2EB70E7300}" type="datetimeFigureOut">
               <a:rPr lang="en-US" smtClean="0"/>
-              <a:t>6/23/19</a:t>
+              <a:t>6/28/19</a:t>
             </a:fld>
             <a:endParaRPr lang="en-US"/>
           </a:p>
@@ -3495,11 +3500,11 @@
               <a:avLst/>
             </a:prstGeom>
             <a:solidFill>
-              <a:srgbClr val="007AFF"/>
+              <a:schemeClr val="tx1"/>
             </a:solidFill>
             <a:ln>
               <a:solidFill>
-                <a:srgbClr val="007AFF"/>
+                <a:schemeClr val="tx1"/>
               </a:solidFill>
             </a:ln>
             <a:scene3d>
@@ -3603,9 +3608,9 @@
             <a:prstGeom prst="line">
               <a:avLst/>
             </a:prstGeom>
-            <a:ln w="19050">
+            <a:ln w="38100">
               <a:solidFill>
-                <a:srgbClr val="007AFF"/>
+                <a:schemeClr val="tx1"/>
               </a:solidFill>
             </a:ln>
           </p:spPr>
@@ -3646,9 +3651,9 @@
             <a:prstGeom prst="line">
               <a:avLst/>
             </a:prstGeom>
-            <a:ln w="19050">
+            <a:ln w="38100">
               <a:solidFill>
-                <a:srgbClr val="007AFF"/>
+                <a:schemeClr val="tx1"/>
               </a:solidFill>
             </a:ln>
           </p:spPr>
@@ -3689,9 +3694,9 @@
             <a:prstGeom prst="line">
               <a:avLst/>
             </a:prstGeom>
-            <a:ln w="19050">
+            <a:ln w="38100">
               <a:solidFill>
-                <a:srgbClr val="007AFF"/>
+                <a:schemeClr val="tx1"/>
               </a:solidFill>
             </a:ln>
           </p:spPr>
@@ -3735,6 +3740,222 @@
           <a:xfrm>
             <a:off x="5283200" y="2616200"/>
             <a:ext cx="1625600" cy="1625600"/>
+          </a:xfrm>
+          <a:prstGeom prst="rect">
+            <a:avLst/>
+          </a:prstGeom>
+        </p:spPr>
+      </p:pic>
+      <p:pic>
+        <p:nvPicPr>
+          <p:cNvPr id="3" name="Graphic 2" descr="Marker">
+            <a:extLst>
+              <a:ext uri="{FF2B5EF4-FFF2-40B4-BE49-F238E27FC236}">
+                <a16:creationId xmlns:a16="http://schemas.microsoft.com/office/drawing/2014/main" id="{1AB76E6F-BCE7-4D44-A0F5-0B235EF36E80}"/>
+              </a:ext>
+            </a:extLst>
+          </p:cNvPr>
+          <p:cNvPicPr>
+            <a:picLocks noChangeAspect="1"/>
+          </p:cNvPicPr>
+          <p:nvPr/>
+        </p:nvPicPr>
+        <p:blipFill>
+          <a:blip r:embed="rId3">
+            <a:extLst>
+              <a:ext uri="{96DAC541-7B7A-43D3-8B79-37D633B846F1}">
+                <asvg:svgBlip xmlns:asvg="http://schemas.microsoft.com/office/drawing/2016/SVG/main" r:embed="rId4"/>
+              </a:ext>
+            </a:extLst>
+          </a:blip>
+          <a:stretch>
+            <a:fillRect/>
+          </a:stretch>
+        </p:blipFill>
+        <p:spPr>
+          <a:xfrm>
+            <a:off x="4092161" y="2978611"/>
+            <a:ext cx="914400" cy="914400"/>
+          </a:xfrm>
+          <a:prstGeom prst="rect">
+            <a:avLst/>
+          </a:prstGeom>
+        </p:spPr>
+      </p:pic>
+      <p:pic>
+        <p:nvPicPr>
+          <p:cNvPr id="8" name="Graphic 7" descr="Flag">
+            <a:extLst>
+              <a:ext uri="{FF2B5EF4-FFF2-40B4-BE49-F238E27FC236}">
+                <a16:creationId xmlns:a16="http://schemas.microsoft.com/office/drawing/2014/main" id="{9E67A536-1810-1549-BB0D-2E77902C50D6}"/>
+              </a:ext>
+            </a:extLst>
+          </p:cNvPr>
+          <p:cNvPicPr>
+            <a:picLocks noChangeAspect="1"/>
+          </p:cNvPicPr>
+          <p:nvPr/>
+        </p:nvPicPr>
+        <p:blipFill>
+          <a:blip r:embed="rId5">
+            <a:extLst>
+              <a:ext uri="{96DAC541-7B7A-43D3-8B79-37D633B846F1}">
+                <asvg:svgBlip xmlns:asvg="http://schemas.microsoft.com/office/drawing/2016/SVG/main" r:embed="rId6"/>
+              </a:ext>
+            </a:extLst>
+          </a:blip>
+          <a:stretch>
+            <a:fillRect/>
+          </a:stretch>
+        </p:blipFill>
+        <p:spPr>
+          <a:xfrm>
+            <a:off x="4656246" y="1890957"/>
+            <a:ext cx="914400" cy="914400"/>
+          </a:xfrm>
+          <a:prstGeom prst="rect">
+            <a:avLst/>
+          </a:prstGeom>
+        </p:spPr>
+      </p:pic>
+      <p:pic>
+        <p:nvPicPr>
+          <p:cNvPr id="12" name="Graphic 11" descr="Map compass">
+            <a:extLst>
+              <a:ext uri="{FF2B5EF4-FFF2-40B4-BE49-F238E27FC236}">
+                <a16:creationId xmlns:a16="http://schemas.microsoft.com/office/drawing/2014/main" id="{2B3D579A-FB49-9845-A037-4362270094B5}"/>
+              </a:ext>
+            </a:extLst>
+          </p:cNvPr>
+          <p:cNvPicPr>
+            <a:picLocks noChangeAspect="1"/>
+          </p:cNvPicPr>
+          <p:nvPr/>
+        </p:nvPicPr>
+        <p:blipFill>
+          <a:blip r:embed="rId7">
+            <a:extLst>
+              <a:ext uri="{96DAC541-7B7A-43D3-8B79-37D633B846F1}">
+                <asvg:svgBlip xmlns:asvg="http://schemas.microsoft.com/office/drawing/2016/SVG/main" r:embed="rId8"/>
+              </a:ext>
+            </a:extLst>
+          </a:blip>
+          <a:stretch>
+            <a:fillRect/>
+          </a:stretch>
+        </p:blipFill>
+        <p:spPr>
+          <a:xfrm>
+            <a:off x="6629400" y="2064211"/>
+            <a:ext cx="914400" cy="914400"/>
+          </a:xfrm>
+          <a:prstGeom prst="rect">
+            <a:avLst/>
+          </a:prstGeom>
+        </p:spPr>
+      </p:pic>
+      <p:pic>
+        <p:nvPicPr>
+          <p:cNvPr id="14" name="Graphic 13" descr="Map with pin">
+            <a:extLst>
+              <a:ext uri="{FF2B5EF4-FFF2-40B4-BE49-F238E27FC236}">
+                <a16:creationId xmlns:a16="http://schemas.microsoft.com/office/drawing/2014/main" id="{2DAA56FB-01E2-C744-B254-8424547ED1E0}"/>
+              </a:ext>
+            </a:extLst>
+          </p:cNvPr>
+          <p:cNvPicPr>
+            <a:picLocks noChangeAspect="1"/>
+          </p:cNvPicPr>
+          <p:nvPr/>
+        </p:nvPicPr>
+        <p:blipFill>
+          <a:blip r:embed="rId9">
+            <a:extLst>
+              <a:ext uri="{96DAC541-7B7A-43D3-8B79-37D633B846F1}">
+                <asvg:svgBlip xmlns:asvg="http://schemas.microsoft.com/office/drawing/2016/SVG/main" r:embed="rId10"/>
+              </a:ext>
+            </a:extLst>
+          </a:blip>
+          <a:stretch>
+            <a:fillRect/>
+          </a:stretch>
+        </p:blipFill>
+        <p:spPr>
+          <a:xfrm>
+            <a:off x="1285026" y="4848244"/>
+            <a:ext cx="1207956" cy="1207956"/>
+          </a:xfrm>
+          <a:prstGeom prst="rect">
+            <a:avLst/>
+          </a:prstGeom>
+        </p:spPr>
+      </p:pic>
+      <p:pic>
+        <p:nvPicPr>
+          <p:cNvPr id="17" name="Graphic 16" descr="Compass">
+            <a:extLst>
+              <a:ext uri="{FF2B5EF4-FFF2-40B4-BE49-F238E27FC236}">
+                <a16:creationId xmlns:a16="http://schemas.microsoft.com/office/drawing/2014/main" id="{0176000C-C428-4F43-B1FC-E9296E8429E9}"/>
+              </a:ext>
+            </a:extLst>
+          </p:cNvPr>
+          <p:cNvPicPr>
+            <a:picLocks noChangeAspect="1"/>
+          </p:cNvPicPr>
+          <p:nvPr/>
+        </p:nvPicPr>
+        <p:blipFill>
+          <a:blip r:embed="rId11">
+            <a:extLst>
+              <a:ext uri="{96DAC541-7B7A-43D3-8B79-37D633B846F1}">
+                <asvg:svgBlip xmlns:asvg="http://schemas.microsoft.com/office/drawing/2016/SVG/main" r:embed="rId12"/>
+              </a:ext>
+            </a:extLst>
+          </a:blip>
+          <a:stretch>
+            <a:fillRect/>
+          </a:stretch>
+        </p:blipFill>
+        <p:spPr>
+          <a:xfrm>
+            <a:off x="5682400" y="4684600"/>
+            <a:ext cx="914400" cy="914400"/>
+          </a:xfrm>
+          <a:prstGeom prst="rect">
+            <a:avLst/>
+          </a:prstGeom>
+        </p:spPr>
+      </p:pic>
+      <p:pic>
+        <p:nvPicPr>
+          <p:cNvPr id="19" name="Graphic 18" descr="Direction">
+            <a:extLst>
+              <a:ext uri="{FF2B5EF4-FFF2-40B4-BE49-F238E27FC236}">
+                <a16:creationId xmlns:a16="http://schemas.microsoft.com/office/drawing/2014/main" id="{F7F7A8BC-B401-334B-8885-3074087A07B3}"/>
+              </a:ext>
+            </a:extLst>
+          </p:cNvPr>
+          <p:cNvPicPr>
+            <a:picLocks noChangeAspect="1"/>
+          </p:cNvPicPr>
+          <p:nvPr/>
+        </p:nvPicPr>
+        <p:blipFill>
+          <a:blip r:embed="rId13">
+            <a:extLst>
+              <a:ext uri="{96DAC541-7B7A-43D3-8B79-37D633B846F1}">
+                <asvg:svgBlip xmlns:asvg="http://schemas.microsoft.com/office/drawing/2016/SVG/main" r:embed="rId14"/>
+              </a:ext>
+            </a:extLst>
+          </a:blip>
+          <a:stretch>
+            <a:fillRect/>
+          </a:stretch>
+        </p:blipFill>
+        <p:spPr>
+          <a:xfrm>
+            <a:off x="4501191" y="4300500"/>
+            <a:ext cx="914400" cy="914400"/>
           </a:xfrm>
           <a:prstGeom prst="rect">
             <a:avLst/>

</xml_diff>